<commit_message>
Adicionados cambios menores en el documento
</commit_message>
<xml_diff>
--- a/CSOF5100 Proyecto 1/0621PresentacionIngenium.pptx
+++ b/CSOF5100 Proyecto 1/0621PresentacionIngenium.pptx
@@ -219,7 +219,7 @@
             <a:fld id="{BF85D653-5FE0-42C2-9D9C-E3D5F26098D2}" type="datetimeFigureOut">
               <a:rPr lang="es-CO" smtClean="0"/>
               <a:pPr/>
-              <a:t>19/05/2011</a:t>
+              <a:t>11/06/2011</a:t>
             </a:fld>
             <a:endParaRPr lang="es-CO"/>
           </a:p>
@@ -381,7 +381,7 @@
             <a:fld id="{6E195558-F735-488E-B766-BCBB520D0067}" type="slidenum">
               <a:rPr lang="es-CO" smtClean="0"/>
               <a:pPr/>
-              <a:t>‹#›</a:t>
+              <a:t>‹Nº›</a:t>
             </a:fld>
             <a:endParaRPr lang="es-CO"/>
           </a:p>
@@ -2635,7 +2635,7 @@
             <a:fld id="{622F2B42-74F1-4278-BCD4-9F2065AEB060}" type="datetimeFigureOut">
               <a:rPr lang="es-CO" smtClean="0"/>
               <a:pPr/>
-              <a:t>19/05/2011</a:t>
+              <a:t>11/06/2011</a:t>
             </a:fld>
             <a:endParaRPr lang="es-CO"/>
           </a:p>
@@ -2678,7 +2678,7 @@
             <a:fld id="{9F5DBAEC-65E4-47B7-8F40-E70D01FFE723}" type="slidenum">
               <a:rPr lang="es-CO" smtClean="0"/>
               <a:pPr/>
-              <a:t>‹#›</a:t>
+              <a:t>‹Nº›</a:t>
             </a:fld>
             <a:endParaRPr lang="es-CO"/>
           </a:p>
@@ -2802,7 +2802,7 @@
             <a:fld id="{622F2B42-74F1-4278-BCD4-9F2065AEB060}" type="datetimeFigureOut">
               <a:rPr lang="es-CO" smtClean="0"/>
               <a:pPr/>
-              <a:t>19/05/2011</a:t>
+              <a:t>11/06/2011</a:t>
             </a:fld>
             <a:endParaRPr lang="es-CO"/>
           </a:p>
@@ -2845,7 +2845,7 @@
             <a:fld id="{9F5DBAEC-65E4-47B7-8F40-E70D01FFE723}" type="slidenum">
               <a:rPr lang="es-CO" smtClean="0"/>
               <a:pPr/>
-              <a:t>‹#›</a:t>
+              <a:t>‹Nº›</a:t>
             </a:fld>
             <a:endParaRPr lang="es-CO"/>
           </a:p>
@@ -2979,7 +2979,7 @@
             <a:fld id="{622F2B42-74F1-4278-BCD4-9F2065AEB060}" type="datetimeFigureOut">
               <a:rPr lang="es-CO" smtClean="0"/>
               <a:pPr/>
-              <a:t>19/05/2011</a:t>
+              <a:t>11/06/2011</a:t>
             </a:fld>
             <a:endParaRPr lang="es-CO"/>
           </a:p>
@@ -3022,7 +3022,7 @@
             <a:fld id="{9F5DBAEC-65E4-47B7-8F40-E70D01FFE723}" type="slidenum">
               <a:rPr lang="es-CO" smtClean="0"/>
               <a:pPr/>
-              <a:t>‹#›</a:t>
+              <a:t>‹Nº›</a:t>
             </a:fld>
             <a:endParaRPr lang="es-CO"/>
           </a:p>
@@ -3146,7 +3146,7 @@
             <a:fld id="{622F2B42-74F1-4278-BCD4-9F2065AEB060}" type="datetimeFigureOut">
               <a:rPr lang="es-CO" smtClean="0"/>
               <a:pPr/>
-              <a:t>19/05/2011</a:t>
+              <a:t>11/06/2011</a:t>
             </a:fld>
             <a:endParaRPr lang="es-CO"/>
           </a:p>
@@ -3189,7 +3189,7 @@
             <a:fld id="{9F5DBAEC-65E4-47B7-8F40-E70D01FFE723}" type="slidenum">
               <a:rPr lang="es-CO" smtClean="0"/>
               <a:pPr/>
-              <a:t>‹#›</a:t>
+              <a:t>‹Nº›</a:t>
             </a:fld>
             <a:endParaRPr lang="es-CO"/>
           </a:p>
@@ -3389,7 +3389,7 @@
             <a:fld id="{622F2B42-74F1-4278-BCD4-9F2065AEB060}" type="datetimeFigureOut">
               <a:rPr lang="es-CO" smtClean="0"/>
               <a:pPr/>
-              <a:t>19/05/2011</a:t>
+              <a:t>11/06/2011</a:t>
             </a:fld>
             <a:endParaRPr lang="es-CO"/>
           </a:p>
@@ -3432,7 +3432,7 @@
             <a:fld id="{9F5DBAEC-65E4-47B7-8F40-E70D01FFE723}" type="slidenum">
               <a:rPr lang="es-CO" smtClean="0"/>
               <a:pPr/>
-              <a:t>‹#›</a:t>
+              <a:t>‹Nº›</a:t>
             </a:fld>
             <a:endParaRPr lang="es-CO"/>
           </a:p>
@@ -3674,7 +3674,7 @@
             <a:fld id="{622F2B42-74F1-4278-BCD4-9F2065AEB060}" type="datetimeFigureOut">
               <a:rPr lang="es-CO" smtClean="0"/>
               <a:pPr/>
-              <a:t>19/05/2011</a:t>
+              <a:t>11/06/2011</a:t>
             </a:fld>
             <a:endParaRPr lang="es-CO"/>
           </a:p>
@@ -3717,7 +3717,7 @@
             <a:fld id="{9F5DBAEC-65E4-47B7-8F40-E70D01FFE723}" type="slidenum">
               <a:rPr lang="es-CO" smtClean="0"/>
               <a:pPr/>
-              <a:t>‹#›</a:t>
+              <a:t>‹Nº›</a:t>
             </a:fld>
             <a:endParaRPr lang="es-CO"/>
           </a:p>
@@ -4093,7 +4093,7 @@
             <a:fld id="{622F2B42-74F1-4278-BCD4-9F2065AEB060}" type="datetimeFigureOut">
               <a:rPr lang="es-CO" smtClean="0"/>
               <a:pPr/>
-              <a:t>19/05/2011</a:t>
+              <a:t>11/06/2011</a:t>
             </a:fld>
             <a:endParaRPr lang="es-CO"/>
           </a:p>
@@ -4136,7 +4136,7 @@
             <a:fld id="{9F5DBAEC-65E4-47B7-8F40-E70D01FFE723}" type="slidenum">
               <a:rPr lang="es-CO" smtClean="0"/>
               <a:pPr/>
-              <a:t>‹#›</a:t>
+              <a:t>‹Nº›</a:t>
             </a:fld>
             <a:endParaRPr lang="es-CO"/>
           </a:p>
@@ -4208,7 +4208,7 @@
             <a:fld id="{622F2B42-74F1-4278-BCD4-9F2065AEB060}" type="datetimeFigureOut">
               <a:rPr lang="es-CO" smtClean="0"/>
               <a:pPr/>
-              <a:t>19/05/2011</a:t>
+              <a:t>11/06/2011</a:t>
             </a:fld>
             <a:endParaRPr lang="es-CO"/>
           </a:p>
@@ -4251,7 +4251,7 @@
             <a:fld id="{9F5DBAEC-65E4-47B7-8F40-E70D01FFE723}" type="slidenum">
               <a:rPr lang="es-CO" smtClean="0"/>
               <a:pPr/>
-              <a:t>‹#›</a:t>
+              <a:t>‹Nº›</a:t>
             </a:fld>
             <a:endParaRPr lang="es-CO"/>
           </a:p>
@@ -4300,7 +4300,7 @@
             <a:fld id="{622F2B42-74F1-4278-BCD4-9F2065AEB060}" type="datetimeFigureOut">
               <a:rPr lang="es-CO" smtClean="0"/>
               <a:pPr/>
-              <a:t>19/05/2011</a:t>
+              <a:t>11/06/2011</a:t>
             </a:fld>
             <a:endParaRPr lang="es-CO"/>
           </a:p>
@@ -4343,7 +4343,7 @@
             <a:fld id="{9F5DBAEC-65E4-47B7-8F40-E70D01FFE723}" type="slidenum">
               <a:rPr lang="es-CO" smtClean="0"/>
               <a:pPr/>
-              <a:t>‹#›</a:t>
+              <a:t>‹Nº›</a:t>
             </a:fld>
             <a:endParaRPr lang="es-CO"/>
           </a:p>
@@ -4574,7 +4574,7 @@
             <a:fld id="{622F2B42-74F1-4278-BCD4-9F2065AEB060}" type="datetimeFigureOut">
               <a:rPr lang="es-CO" smtClean="0"/>
               <a:pPr/>
-              <a:t>19/05/2011</a:t>
+              <a:t>11/06/2011</a:t>
             </a:fld>
             <a:endParaRPr lang="es-CO"/>
           </a:p>
@@ -4617,7 +4617,7 @@
             <a:fld id="{9F5DBAEC-65E4-47B7-8F40-E70D01FFE723}" type="slidenum">
               <a:rPr lang="es-CO" smtClean="0"/>
               <a:pPr/>
-              <a:t>‹#›</a:t>
+              <a:t>‹Nº›</a:t>
             </a:fld>
             <a:endParaRPr lang="es-CO"/>
           </a:p>
@@ -4824,7 +4824,7 @@
             <a:fld id="{622F2B42-74F1-4278-BCD4-9F2065AEB060}" type="datetimeFigureOut">
               <a:rPr lang="es-CO" smtClean="0"/>
               <a:pPr/>
-              <a:t>19/05/2011</a:t>
+              <a:t>11/06/2011</a:t>
             </a:fld>
             <a:endParaRPr lang="es-CO"/>
           </a:p>
@@ -4867,7 +4867,7 @@
             <a:fld id="{9F5DBAEC-65E4-47B7-8F40-E70D01FFE723}" type="slidenum">
               <a:rPr lang="es-CO" smtClean="0"/>
               <a:pPr/>
-              <a:t>‹#›</a:t>
+              <a:t>‹Nº›</a:t>
             </a:fld>
             <a:endParaRPr lang="es-CO"/>
           </a:p>
@@ -5034,7 +5034,7 @@
             <a:fld id="{622F2B42-74F1-4278-BCD4-9F2065AEB060}" type="datetimeFigureOut">
               <a:rPr lang="es-CO" smtClean="0"/>
               <a:pPr/>
-              <a:t>19/05/2011</a:t>
+              <a:t>11/06/2011</a:t>
             </a:fld>
             <a:endParaRPr lang="es-CO"/>
           </a:p>
@@ -5113,7 +5113,7 @@
             <a:fld id="{9F5DBAEC-65E4-47B7-8F40-E70D01FFE723}" type="slidenum">
               <a:rPr lang="es-CO" smtClean="0"/>
               <a:pPr/>
-              <a:t>‹#›</a:t>
+              <a:t>‹Nº›</a:t>
             </a:fld>
             <a:endParaRPr lang="es-CO"/>
           </a:p>
@@ -5991,7 +5991,7 @@
     </p:spTree>
     <p:extLst>
       <p:ext uri="{BB962C8B-B14F-4D97-AF65-F5344CB8AC3E}">
-        <p14:creationId xmlns:p14="http://schemas.microsoft.com/office/powerpoint/2010/main" xmlns="" val="2194094149"/>
+        <p14:creationId xmlns="" xmlns:p14="http://schemas.microsoft.com/office/powerpoint/2010/main" val="2194094149"/>
       </p:ext>
     </p:extLst>
   </p:cSld>
@@ -8763,7 +8763,7 @@
         </p:xfrm>
         <a:graphic>
           <a:graphicData uri="http://schemas.openxmlformats.org/presentationml/2006/ole">
-            <p:oleObj spid="_x0000_s7169" name="Visio" r:id="rId7" imgW="9034758" imgH="9754681" progId="">
+            <p:oleObj spid="_x0000_s7169" name="Visio" r:id="rId7" imgW="9034758" imgH="9754681" progId="Visio.Drawing.11">
               <p:embed/>
             </p:oleObj>
           </a:graphicData>
@@ -9670,7 +9670,7 @@
         </p:xfrm>
         <a:graphic>
           <a:graphicData uri="http://schemas.openxmlformats.org/presentationml/2006/ole">
-            <p:oleObj spid="_x0000_s35841" name="Visio" r:id="rId7" imgW="7052479" imgH="5178864" progId="">
+            <p:oleObj spid="_x0000_s35841" name="Visio" r:id="rId7" imgW="7052479" imgH="5178864" progId="Visio.Drawing.11">
               <p:embed/>
             </p:oleObj>
           </a:graphicData>
@@ -9738,13 +9738,13 @@
             </a:prstGeom>
           </p:spPr>
           <p:style>
-            <a:lnRef idx="1">
+            <a:lnRef idx="2">
               <a:schemeClr val="accent1"/>
             </a:lnRef>
-            <a:fillRef idx="2">
-              <a:schemeClr val="accent1"/>
+            <a:fillRef idx="1">
+              <a:schemeClr val="lt1"/>
             </a:fillRef>
-            <a:effectRef idx="1">
+            <a:effectRef idx="0">
               <a:schemeClr val="accent1"/>
             </a:effectRef>
             <a:fontRef idx="minor">
@@ -9783,13 +9783,13 @@
             </a:prstGeom>
           </p:spPr>
           <p:style>
-            <a:lnRef idx="1">
+            <a:lnRef idx="2">
               <a:schemeClr val="accent1"/>
             </a:lnRef>
-            <a:fillRef idx="2">
-              <a:schemeClr val="accent1"/>
+            <a:fillRef idx="1">
+              <a:schemeClr val="lt1"/>
             </a:fillRef>
-            <a:effectRef idx="1">
+            <a:effectRef idx="0">
               <a:schemeClr val="accent1"/>
             </a:effectRef>
             <a:fontRef idx="minor">
@@ -9856,13 +9856,13 @@
             </a:prstGeom>
           </p:spPr>
           <p:style>
-            <a:lnRef idx="1">
+            <a:lnRef idx="2">
               <a:schemeClr val="accent1"/>
             </a:lnRef>
-            <a:fillRef idx="2">
-              <a:schemeClr val="accent1"/>
+            <a:fillRef idx="1">
+              <a:schemeClr val="lt1"/>
             </a:fillRef>
-            <a:effectRef idx="1">
+            <a:effectRef idx="0">
               <a:schemeClr val="accent1"/>
             </a:effectRef>
             <a:fontRef idx="minor">
@@ -9901,13 +9901,13 @@
             </a:prstGeom>
           </p:spPr>
           <p:style>
-            <a:lnRef idx="1">
+            <a:lnRef idx="2">
               <a:schemeClr val="accent1"/>
             </a:lnRef>
-            <a:fillRef idx="2">
-              <a:schemeClr val="accent1"/>
+            <a:fillRef idx="1">
+              <a:schemeClr val="lt1"/>
             </a:fillRef>
-            <a:effectRef idx="1">
+            <a:effectRef idx="0">
               <a:schemeClr val="accent1"/>
             </a:effectRef>
             <a:fontRef idx="minor">
@@ -9974,13 +9974,13 @@
             </a:prstGeom>
           </p:spPr>
           <p:style>
-            <a:lnRef idx="1">
+            <a:lnRef idx="2">
               <a:schemeClr val="accent1"/>
             </a:lnRef>
-            <a:fillRef idx="2">
-              <a:schemeClr val="accent1"/>
+            <a:fillRef idx="1">
+              <a:schemeClr val="lt1"/>
             </a:fillRef>
-            <a:effectRef idx="1">
+            <a:effectRef idx="0">
               <a:schemeClr val="accent1"/>
             </a:effectRef>
             <a:fontRef idx="minor">
@@ -10015,13 +10015,13 @@
             </a:prstGeom>
           </p:spPr>
           <p:style>
-            <a:lnRef idx="1">
+            <a:lnRef idx="2">
               <a:schemeClr val="accent1"/>
             </a:lnRef>
-            <a:fillRef idx="2">
-              <a:schemeClr val="accent1"/>
+            <a:fillRef idx="1">
+              <a:schemeClr val="lt1"/>
             </a:fillRef>
-            <a:effectRef idx="1">
+            <a:effectRef idx="0">
               <a:schemeClr val="accent1"/>
             </a:effectRef>
             <a:fontRef idx="minor">
@@ -10088,13 +10088,13 @@
             </a:prstGeom>
           </p:spPr>
           <p:style>
-            <a:lnRef idx="1">
+            <a:lnRef idx="2">
               <a:schemeClr val="accent1"/>
             </a:lnRef>
-            <a:fillRef idx="2">
-              <a:schemeClr val="accent1"/>
+            <a:fillRef idx="1">
+              <a:schemeClr val="lt1"/>
             </a:fillRef>
-            <a:effectRef idx="1">
+            <a:effectRef idx="0">
               <a:schemeClr val="accent1"/>
             </a:effectRef>
             <a:fontRef idx="minor">
@@ -10133,13 +10133,13 @@
             </a:prstGeom>
           </p:spPr>
           <p:style>
-            <a:lnRef idx="1">
+            <a:lnRef idx="2">
               <a:schemeClr val="accent1"/>
             </a:lnRef>
-            <a:fillRef idx="2">
-              <a:schemeClr val="accent1"/>
+            <a:fillRef idx="1">
+              <a:schemeClr val="lt1"/>
             </a:fillRef>
-            <a:effectRef idx="1">
+            <a:effectRef idx="0">
               <a:schemeClr val="accent1"/>
             </a:effectRef>
             <a:fontRef idx="minor">
@@ -10189,6 +10189,12 @@
             <a:chOff x="467544" y="1988840"/>
             <a:chExt cx="1570464" cy="634360"/>
           </a:xfrm>
+          <a:solidFill>
+            <a:schemeClr val="accent1">
+              <a:lumMod val="20000"/>
+              <a:lumOff val="80000"/>
+            </a:schemeClr>
+          </a:solidFill>
         </p:grpSpPr>
         <p:sp>
           <p:nvSpPr>
@@ -10204,20 +10210,21 @@
             <a:prstGeom prst="rect">
               <a:avLst/>
             </a:prstGeom>
+            <a:grpFill/>
             <a:ln/>
           </p:spPr>
           <p:style>
-            <a:lnRef idx="1">
+            <a:lnRef idx="2">
               <a:schemeClr val="accent1"/>
             </a:lnRef>
-            <a:fillRef idx="3">
-              <a:schemeClr val="accent1"/>
+            <a:fillRef idx="1">
+              <a:schemeClr val="lt1"/>
             </a:fillRef>
-            <a:effectRef idx="2">
+            <a:effectRef idx="0">
               <a:schemeClr val="accent1"/>
             </a:effectRef>
             <a:fontRef idx="minor">
-              <a:schemeClr val="lt1"/>
+              <a:schemeClr val="dk1"/>
             </a:fontRef>
           </p:style>
           <p:txBody>
@@ -10229,12 +10236,12 @@
                 <a:t>Crear </a:t>
               </a:r>
               <a:r>
-                <a:rPr lang="es-CO" sz="1200" b="1" dirty="0" err="1" smtClean="0"/>
-                <a:t>Generacion</a:t>
+                <a:rPr lang="es-CO" sz="1200" b="1" dirty="0" smtClean="0"/>
+                <a:t>Generación </a:t>
               </a:r>
               <a:r>
                 <a:rPr lang="es-CO" sz="1200" b="1" dirty="0" smtClean="0"/>
-                <a:t> de Informes</a:t>
+                <a:t>de Informes</a:t>
               </a:r>
               <a:endParaRPr lang="es-CO" sz="1200" b="1" dirty="0"/>
             </a:p>
@@ -10254,20 +10261,21 @@
             <a:prstGeom prst="ellipse">
               <a:avLst/>
             </a:prstGeom>
+            <a:grpFill/>
             <a:ln/>
           </p:spPr>
           <p:style>
-            <a:lnRef idx="1">
+            <a:lnRef idx="2">
               <a:schemeClr val="accent1"/>
             </a:lnRef>
-            <a:fillRef idx="3">
-              <a:schemeClr val="accent1"/>
+            <a:fillRef idx="1">
+              <a:schemeClr val="lt1"/>
             </a:fillRef>
-            <a:effectRef idx="2">
+            <a:effectRef idx="0">
               <a:schemeClr val="accent1"/>
             </a:effectRef>
             <a:fontRef idx="minor">
-              <a:schemeClr val="lt1"/>
+              <a:schemeClr val="dk1"/>
             </a:fontRef>
           </p:style>
           <p:txBody>
@@ -10330,13 +10338,13 @@
             </a:prstGeom>
           </p:spPr>
           <p:style>
-            <a:lnRef idx="1">
+            <a:lnRef idx="2">
               <a:schemeClr val="accent1"/>
             </a:lnRef>
-            <a:fillRef idx="2">
-              <a:schemeClr val="accent1"/>
+            <a:fillRef idx="1">
+              <a:schemeClr val="lt1"/>
             </a:fillRef>
-            <a:effectRef idx="1">
+            <a:effectRef idx="0">
               <a:schemeClr val="accent1"/>
             </a:effectRef>
             <a:fontRef idx="minor">
@@ -10371,13 +10379,13 @@
             </a:prstGeom>
           </p:spPr>
           <p:style>
-            <a:lnRef idx="1">
+            <a:lnRef idx="2">
               <a:schemeClr val="accent1"/>
             </a:lnRef>
-            <a:fillRef idx="2">
-              <a:schemeClr val="accent1"/>
+            <a:fillRef idx="1">
+              <a:schemeClr val="lt1"/>
             </a:fillRef>
-            <a:effectRef idx="1">
+            <a:effectRef idx="0">
               <a:schemeClr val="accent1"/>
             </a:effectRef>
             <a:fontRef idx="minor">
@@ -10444,13 +10452,13 @@
             </a:prstGeom>
           </p:spPr>
           <p:style>
-            <a:lnRef idx="1">
+            <a:lnRef idx="2">
               <a:schemeClr val="accent1"/>
             </a:lnRef>
-            <a:fillRef idx="2">
-              <a:schemeClr val="accent1"/>
+            <a:fillRef idx="1">
+              <a:schemeClr val="lt1"/>
             </a:fillRef>
-            <a:effectRef idx="1">
+            <a:effectRef idx="0">
               <a:schemeClr val="accent1"/>
             </a:effectRef>
             <a:fontRef idx="minor">
@@ -10489,13 +10497,13 @@
             </a:prstGeom>
           </p:spPr>
           <p:style>
-            <a:lnRef idx="1">
+            <a:lnRef idx="2">
               <a:schemeClr val="accent1"/>
             </a:lnRef>
-            <a:fillRef idx="2">
-              <a:schemeClr val="accent1"/>
+            <a:fillRef idx="1">
+              <a:schemeClr val="lt1"/>
             </a:fillRef>
-            <a:effectRef idx="1">
+            <a:effectRef idx="0">
               <a:schemeClr val="accent1"/>
             </a:effectRef>
             <a:fontRef idx="minor">
@@ -10562,13 +10570,13 @@
             </a:prstGeom>
           </p:spPr>
           <p:style>
-            <a:lnRef idx="1">
+            <a:lnRef idx="2">
               <a:schemeClr val="accent1"/>
             </a:lnRef>
-            <a:fillRef idx="2">
-              <a:schemeClr val="accent1"/>
+            <a:fillRef idx="1">
+              <a:schemeClr val="lt1"/>
             </a:fillRef>
-            <a:effectRef idx="1">
+            <a:effectRef idx="0">
               <a:schemeClr val="accent1"/>
             </a:effectRef>
             <a:fontRef idx="minor">
@@ -10607,13 +10615,13 @@
             </a:prstGeom>
           </p:spPr>
           <p:style>
-            <a:lnRef idx="1">
+            <a:lnRef idx="2">
               <a:schemeClr val="accent1"/>
             </a:lnRef>
-            <a:fillRef idx="2">
-              <a:schemeClr val="accent1"/>
+            <a:fillRef idx="1">
+              <a:schemeClr val="lt1"/>
             </a:fillRef>
-            <a:effectRef idx="1">
+            <a:effectRef idx="0">
               <a:schemeClr val="accent1"/>
             </a:effectRef>
             <a:fontRef idx="minor">
@@ -10680,13 +10688,13 @@
             </a:prstGeom>
           </p:spPr>
           <p:style>
-            <a:lnRef idx="1">
+            <a:lnRef idx="2">
               <a:schemeClr val="accent1"/>
             </a:lnRef>
-            <a:fillRef idx="2">
-              <a:schemeClr val="accent1"/>
+            <a:fillRef idx="1">
+              <a:schemeClr val="lt1"/>
             </a:fillRef>
-            <a:effectRef idx="1">
+            <a:effectRef idx="0">
               <a:schemeClr val="accent1"/>
             </a:effectRef>
             <a:fontRef idx="minor">
@@ -10725,13 +10733,13 @@
             </a:prstGeom>
           </p:spPr>
           <p:style>
-            <a:lnRef idx="1">
+            <a:lnRef idx="2">
               <a:schemeClr val="accent1"/>
             </a:lnRef>
-            <a:fillRef idx="2">
-              <a:schemeClr val="accent1"/>
+            <a:fillRef idx="1">
+              <a:schemeClr val="lt1"/>
             </a:fillRef>
-            <a:effectRef idx="1">
+            <a:effectRef idx="0">
               <a:schemeClr val="accent1"/>
             </a:effectRef>
             <a:fontRef idx="minor">
@@ -11169,13 +11177,13 @@
             </a:prstGeom>
           </p:spPr>
           <p:style>
-            <a:lnRef idx="1">
+            <a:lnRef idx="2">
               <a:schemeClr val="accent2"/>
             </a:lnRef>
-            <a:fillRef idx="2">
-              <a:schemeClr val="accent2"/>
+            <a:fillRef idx="1">
+              <a:schemeClr val="lt1"/>
             </a:fillRef>
-            <a:effectRef idx="1">
+            <a:effectRef idx="0">
               <a:schemeClr val="accent2"/>
             </a:effectRef>
             <a:fontRef idx="minor">
@@ -11218,13 +11226,13 @@
             </a:prstGeom>
           </p:spPr>
           <p:style>
-            <a:lnRef idx="1">
+            <a:lnRef idx="2">
               <a:schemeClr val="accent2"/>
             </a:lnRef>
-            <a:fillRef idx="2">
-              <a:schemeClr val="accent2"/>
+            <a:fillRef idx="1">
+              <a:schemeClr val="lt1"/>
             </a:fillRef>
-            <a:effectRef idx="1">
+            <a:effectRef idx="0">
               <a:schemeClr val="accent2"/>
             </a:effectRef>
             <a:fontRef idx="minor">
@@ -11291,13 +11299,13 @@
             </a:prstGeom>
           </p:spPr>
           <p:style>
-            <a:lnRef idx="1">
+            <a:lnRef idx="2">
               <a:schemeClr val="accent2"/>
             </a:lnRef>
-            <a:fillRef idx="2">
-              <a:schemeClr val="accent2"/>
+            <a:fillRef idx="1">
+              <a:schemeClr val="lt1"/>
             </a:fillRef>
-            <a:effectRef idx="1">
+            <a:effectRef idx="0">
               <a:schemeClr val="accent2"/>
             </a:effectRef>
             <a:fontRef idx="minor">
@@ -11332,13 +11340,13 @@
             </a:prstGeom>
           </p:spPr>
           <p:style>
-            <a:lnRef idx="1">
+            <a:lnRef idx="2">
               <a:schemeClr val="accent2"/>
             </a:lnRef>
-            <a:fillRef idx="2">
-              <a:schemeClr val="accent2"/>
+            <a:fillRef idx="1">
+              <a:schemeClr val="lt1"/>
             </a:fillRef>
-            <a:effectRef idx="1">
+            <a:effectRef idx="0">
               <a:schemeClr val="accent2"/>
             </a:effectRef>
             <a:fontRef idx="minor">
@@ -11405,13 +11413,13 @@
             </a:prstGeom>
           </p:spPr>
           <p:style>
-            <a:lnRef idx="1">
+            <a:lnRef idx="2">
               <a:schemeClr val="accent2"/>
             </a:lnRef>
-            <a:fillRef idx="2">
-              <a:schemeClr val="accent2"/>
+            <a:fillRef idx="1">
+              <a:schemeClr val="lt1"/>
             </a:fillRef>
-            <a:effectRef idx="1">
+            <a:effectRef idx="0">
               <a:schemeClr val="accent2"/>
             </a:effectRef>
             <a:fontRef idx="minor">
@@ -11446,13 +11454,13 @@
             </a:prstGeom>
           </p:spPr>
           <p:style>
-            <a:lnRef idx="1">
+            <a:lnRef idx="2">
               <a:schemeClr val="accent2"/>
             </a:lnRef>
-            <a:fillRef idx="2">
-              <a:schemeClr val="accent2"/>
+            <a:fillRef idx="1">
+              <a:schemeClr val="lt1"/>
             </a:fillRef>
-            <a:effectRef idx="1">
+            <a:effectRef idx="0">
               <a:schemeClr val="accent2"/>
             </a:effectRef>
             <a:fontRef idx="minor">
@@ -11519,13 +11527,13 @@
             </a:prstGeom>
           </p:spPr>
           <p:style>
-            <a:lnRef idx="1">
+            <a:lnRef idx="2">
               <a:schemeClr val="accent2"/>
             </a:lnRef>
-            <a:fillRef idx="2">
-              <a:schemeClr val="accent2"/>
+            <a:fillRef idx="1">
+              <a:schemeClr val="lt1"/>
             </a:fillRef>
-            <a:effectRef idx="1">
+            <a:effectRef idx="0">
               <a:schemeClr val="accent2"/>
             </a:effectRef>
             <a:fontRef idx="minor">
@@ -11564,13 +11572,13 @@
             </a:prstGeom>
           </p:spPr>
           <p:style>
-            <a:lnRef idx="1">
+            <a:lnRef idx="2">
               <a:schemeClr val="accent2"/>
             </a:lnRef>
-            <a:fillRef idx="2">
-              <a:schemeClr val="accent2"/>
+            <a:fillRef idx="1">
+              <a:schemeClr val="lt1"/>
             </a:fillRef>
-            <a:effectRef idx="1">
+            <a:effectRef idx="0">
               <a:schemeClr val="accent2"/>
             </a:effectRef>
             <a:fontRef idx="minor">
@@ -11637,13 +11645,13 @@
             </a:prstGeom>
           </p:spPr>
           <p:style>
-            <a:lnRef idx="1">
+            <a:lnRef idx="2">
               <a:schemeClr val="accent2"/>
             </a:lnRef>
-            <a:fillRef idx="2">
-              <a:schemeClr val="accent2"/>
+            <a:fillRef idx="1">
+              <a:schemeClr val="lt1"/>
             </a:fillRef>
-            <a:effectRef idx="1">
+            <a:effectRef idx="0">
               <a:schemeClr val="accent2"/>
             </a:effectRef>
             <a:fontRef idx="minor">
@@ -11682,13 +11690,13 @@
             </a:prstGeom>
           </p:spPr>
           <p:style>
-            <a:lnRef idx="1">
+            <a:lnRef idx="2">
               <a:schemeClr val="accent2"/>
             </a:lnRef>
-            <a:fillRef idx="2">
-              <a:schemeClr val="accent2"/>
+            <a:fillRef idx="1">
+              <a:schemeClr val="lt1"/>
             </a:fillRef>
-            <a:effectRef idx="1">
+            <a:effectRef idx="0">
               <a:schemeClr val="accent2"/>
             </a:effectRef>
             <a:fontRef idx="minor">
@@ -11738,6 +11746,12 @@
             <a:chOff x="467544" y="1988840"/>
             <a:chExt cx="1570464" cy="634360"/>
           </a:xfrm>
+          <a:solidFill>
+            <a:schemeClr val="accent2">
+              <a:lumMod val="40000"/>
+              <a:lumOff val="60000"/>
+            </a:schemeClr>
+          </a:solidFill>
         </p:grpSpPr>
         <p:sp>
           <p:nvSpPr>
@@ -11753,19 +11767,20 @@
             <a:prstGeom prst="rect">
               <a:avLst/>
             </a:prstGeom>
+            <a:grpFill/>
           </p:spPr>
           <p:style>
-            <a:lnRef idx="1">
+            <a:lnRef idx="2">
               <a:schemeClr val="accent2"/>
             </a:lnRef>
-            <a:fillRef idx="3">
-              <a:schemeClr val="accent2"/>
+            <a:fillRef idx="1">
+              <a:schemeClr val="lt1"/>
             </a:fillRef>
-            <a:effectRef idx="2">
+            <a:effectRef idx="0">
               <a:schemeClr val="accent2"/>
             </a:effectRef>
             <a:fontRef idx="minor">
-              <a:schemeClr val="lt1"/>
+              <a:schemeClr val="dk1"/>
             </a:fontRef>
           </p:style>
           <p:txBody>
@@ -11794,19 +11809,20 @@
             <a:prstGeom prst="ellipse">
               <a:avLst/>
             </a:prstGeom>
+            <a:grpFill/>
           </p:spPr>
           <p:style>
-            <a:lnRef idx="1">
+            <a:lnRef idx="2">
               <a:schemeClr val="accent2"/>
             </a:lnRef>
-            <a:fillRef idx="3">
-              <a:schemeClr val="accent2"/>
+            <a:fillRef idx="1">
+              <a:schemeClr val="lt1"/>
             </a:fillRef>
-            <a:effectRef idx="2">
+            <a:effectRef idx="0">
               <a:schemeClr val="accent2"/>
             </a:effectRef>
             <a:fontRef idx="minor">
-              <a:schemeClr val="lt1"/>
+              <a:schemeClr val="dk1"/>
             </a:fontRef>
           </p:style>
           <p:txBody>
@@ -11935,13 +11951,13 @@
             </a:prstGeom>
           </p:spPr>
           <p:style>
-            <a:lnRef idx="1">
+            <a:lnRef idx="2">
               <a:schemeClr val="accent3"/>
             </a:lnRef>
-            <a:fillRef idx="2">
-              <a:schemeClr val="accent3"/>
+            <a:fillRef idx="1">
+              <a:schemeClr val="lt1"/>
             </a:fillRef>
-            <a:effectRef idx="1">
+            <a:effectRef idx="0">
               <a:schemeClr val="accent3"/>
             </a:effectRef>
             <a:fontRef idx="minor">
@@ -11953,12 +11969,12 @@
             <a:lstStyle/>
             <a:p>
               <a:r>
-                <a:rPr lang="es-CO" sz="1200" b="1" dirty="0" err="1" smtClean="0"/>
-                <a:t>Integracion</a:t>
+                <a:rPr lang="es-CO" sz="1200" b="1" dirty="0" smtClean="0"/>
+                <a:t>Integración </a:t>
               </a:r>
               <a:r>
                 <a:rPr lang="es-CO" sz="1200" b="1" dirty="0" smtClean="0"/>
-                <a:t> Sistema de Pago</a:t>
+                <a:t>Sistema de Pago</a:t>
               </a:r>
               <a:endParaRPr lang="es-CO" sz="1200" b="1" dirty="0"/>
             </a:p>
@@ -11980,13 +11996,13 @@
             </a:prstGeom>
           </p:spPr>
           <p:style>
-            <a:lnRef idx="1">
+            <a:lnRef idx="2">
               <a:schemeClr val="accent3"/>
             </a:lnRef>
-            <a:fillRef idx="2">
-              <a:schemeClr val="accent3"/>
+            <a:fillRef idx="1">
+              <a:schemeClr val="lt1"/>
             </a:fillRef>
-            <a:effectRef idx="1">
+            <a:effectRef idx="0">
               <a:schemeClr val="accent3"/>
             </a:effectRef>
             <a:fontRef idx="minor">
@@ -12053,13 +12069,13 @@
             </a:prstGeom>
           </p:spPr>
           <p:style>
-            <a:lnRef idx="1">
+            <a:lnRef idx="2">
               <a:schemeClr val="accent3"/>
             </a:lnRef>
-            <a:fillRef idx="2">
-              <a:schemeClr val="accent3"/>
+            <a:fillRef idx="1">
+              <a:schemeClr val="lt1"/>
             </a:fillRef>
-            <a:effectRef idx="1">
+            <a:effectRef idx="0">
               <a:schemeClr val="accent3"/>
             </a:effectRef>
             <a:fontRef idx="minor">
@@ -12071,12 +12087,8 @@
             <a:lstStyle/>
             <a:p>
               <a:r>
-                <a:rPr lang="es-CO" sz="1200" b="1" dirty="0" err="1" smtClean="0"/>
-                <a:t>Integracion</a:t>
-              </a:r>
-              <a:r>
                 <a:rPr lang="es-CO" sz="1200" b="1" dirty="0" smtClean="0"/>
-                <a:t> </a:t>
+                <a:t>Integración </a:t>
               </a:r>
               <a:r>
                 <a:rPr lang="es-CO" sz="1200" b="1" dirty="0" err="1" smtClean="0"/>
@@ -12110,13 +12122,13 @@
             </a:prstGeom>
           </p:spPr>
           <p:style>
-            <a:lnRef idx="1">
+            <a:lnRef idx="2">
               <a:schemeClr val="accent3"/>
             </a:lnRef>
-            <a:fillRef idx="2">
-              <a:schemeClr val="accent3"/>
+            <a:fillRef idx="1">
+              <a:schemeClr val="lt1"/>
             </a:fillRef>
-            <a:effectRef idx="1">
+            <a:effectRef idx="0">
               <a:schemeClr val="accent3"/>
             </a:effectRef>
             <a:fontRef idx="minor">
@@ -12183,13 +12195,13 @@
             </a:prstGeom>
           </p:spPr>
           <p:style>
-            <a:lnRef idx="1">
+            <a:lnRef idx="2">
               <a:schemeClr val="accent3"/>
             </a:lnRef>
-            <a:fillRef idx="2">
-              <a:schemeClr val="accent3"/>
+            <a:fillRef idx="1">
+              <a:schemeClr val="lt1"/>
             </a:fillRef>
-            <a:effectRef idx="1">
+            <a:effectRef idx="0">
               <a:schemeClr val="accent3"/>
             </a:effectRef>
             <a:fontRef idx="minor">
@@ -12224,13 +12236,13 @@
             </a:prstGeom>
           </p:spPr>
           <p:style>
-            <a:lnRef idx="1">
+            <a:lnRef idx="2">
               <a:schemeClr val="accent3"/>
             </a:lnRef>
-            <a:fillRef idx="2">
-              <a:schemeClr val="accent3"/>
+            <a:fillRef idx="1">
+              <a:schemeClr val="lt1"/>
             </a:fillRef>
-            <a:effectRef idx="1">
+            <a:effectRef idx="0">
               <a:schemeClr val="accent3"/>
             </a:effectRef>
             <a:fontRef idx="minor">
@@ -12297,13 +12309,13 @@
             </a:prstGeom>
           </p:spPr>
           <p:style>
-            <a:lnRef idx="1">
+            <a:lnRef idx="2">
               <a:schemeClr val="accent3"/>
             </a:lnRef>
-            <a:fillRef idx="2">
-              <a:schemeClr val="accent3"/>
+            <a:fillRef idx="1">
+              <a:schemeClr val="lt1"/>
             </a:fillRef>
-            <a:effectRef idx="1">
+            <a:effectRef idx="0">
               <a:schemeClr val="accent3"/>
             </a:effectRef>
             <a:fontRef idx="minor">
@@ -12315,12 +12327,12 @@
             <a:lstStyle/>
             <a:p>
               <a:r>
-                <a:rPr lang="es-CO" sz="1200" b="1" dirty="0" err="1" smtClean="0"/>
-                <a:t>Implementacion</a:t>
+                <a:rPr lang="es-CO" sz="1200" b="1" dirty="0" smtClean="0"/>
+                <a:t>Implementación </a:t>
               </a:r>
               <a:r>
                 <a:rPr lang="es-CO" sz="1200" b="1" dirty="0" smtClean="0"/>
-                <a:t> TRM</a:t>
+                <a:t>TRM</a:t>
               </a:r>
               <a:endParaRPr lang="es-CO" sz="1200" b="1" dirty="0"/>
             </a:p>
@@ -12342,13 +12354,13 @@
             </a:prstGeom>
           </p:spPr>
           <p:style>
-            <a:lnRef idx="1">
+            <a:lnRef idx="2">
               <a:schemeClr val="accent3"/>
             </a:lnRef>
-            <a:fillRef idx="2">
-              <a:schemeClr val="accent3"/>
+            <a:fillRef idx="1">
+              <a:schemeClr val="lt1"/>
             </a:fillRef>
-            <a:effectRef idx="1">
+            <a:effectRef idx="0">
               <a:schemeClr val="accent3"/>
             </a:effectRef>
             <a:fontRef idx="minor">
@@ -12415,13 +12427,13 @@
             </a:prstGeom>
           </p:spPr>
           <p:style>
-            <a:lnRef idx="1">
+            <a:lnRef idx="2">
               <a:schemeClr val="accent3"/>
             </a:lnRef>
-            <a:fillRef idx="2">
-              <a:schemeClr val="accent3"/>
+            <a:fillRef idx="1">
+              <a:schemeClr val="lt1"/>
             </a:fillRef>
-            <a:effectRef idx="1">
+            <a:effectRef idx="0">
               <a:schemeClr val="accent3"/>
             </a:effectRef>
             <a:fontRef idx="minor">
@@ -12480,13 +12492,13 @@
             </a:prstGeom>
           </p:spPr>
           <p:style>
-            <a:lnRef idx="1">
+            <a:lnRef idx="2">
               <a:schemeClr val="accent3"/>
             </a:lnRef>
-            <a:fillRef idx="2">
-              <a:schemeClr val="accent3"/>
+            <a:fillRef idx="1">
+              <a:schemeClr val="lt1"/>
             </a:fillRef>
-            <a:effectRef idx="1">
+            <a:effectRef idx="0">
               <a:schemeClr val="accent3"/>
             </a:effectRef>
             <a:fontRef idx="minor">
@@ -12553,13 +12565,13 @@
             </a:prstGeom>
           </p:spPr>
           <p:style>
-            <a:lnRef idx="1">
+            <a:lnRef idx="2">
               <a:schemeClr val="accent3"/>
             </a:lnRef>
-            <a:fillRef idx="2">
-              <a:schemeClr val="accent3"/>
+            <a:fillRef idx="1">
+              <a:schemeClr val="lt1"/>
             </a:fillRef>
-            <a:effectRef idx="1">
+            <a:effectRef idx="0">
               <a:schemeClr val="accent3"/>
             </a:effectRef>
             <a:fontRef idx="minor">
@@ -12571,12 +12583,8 @@
             <a:lstStyle/>
             <a:p>
               <a:r>
-                <a:rPr lang="es-CO" sz="1200" b="1" dirty="0" err="1" smtClean="0"/>
-                <a:t>Adaptacion</a:t>
-              </a:r>
-              <a:r>
                 <a:rPr lang="es-CO" sz="1200" b="1" dirty="0" smtClean="0"/>
-                <a:t> </a:t>
+                <a:t>Adaptación </a:t>
               </a:r>
               <a:r>
                 <a:rPr lang="es-CO" sz="1200" b="1" dirty="0" err="1" smtClean="0"/>
@@ -12602,13 +12610,13 @@
             </a:prstGeom>
           </p:spPr>
           <p:style>
-            <a:lnRef idx="1">
+            <a:lnRef idx="2">
               <a:schemeClr val="accent3"/>
             </a:lnRef>
-            <a:fillRef idx="2">
-              <a:schemeClr val="accent3"/>
+            <a:fillRef idx="1">
+              <a:schemeClr val="lt1"/>
             </a:fillRef>
-            <a:effectRef idx="1">
+            <a:effectRef idx="0">
               <a:schemeClr val="accent3"/>
             </a:effectRef>
             <a:fontRef idx="minor">
@@ -12675,13 +12683,13 @@
             </a:prstGeom>
           </p:spPr>
           <p:style>
-            <a:lnRef idx="1">
+            <a:lnRef idx="2">
               <a:schemeClr val="accent3"/>
             </a:lnRef>
-            <a:fillRef idx="2">
-              <a:schemeClr val="accent3"/>
+            <a:fillRef idx="1">
+              <a:schemeClr val="lt1"/>
             </a:fillRef>
-            <a:effectRef idx="1">
+            <a:effectRef idx="0">
               <a:schemeClr val="accent3"/>
             </a:effectRef>
             <a:fontRef idx="minor">
@@ -12693,12 +12701,12 @@
             <a:lstStyle/>
             <a:p>
               <a:r>
-                <a:rPr lang="es-CO" sz="1200" b="1" dirty="0" err="1" smtClean="0"/>
-                <a:t>Integracion</a:t>
+                <a:rPr lang="es-CO" sz="1200" b="1" dirty="0" smtClean="0"/>
+                <a:t>Integración </a:t>
               </a:r>
               <a:r>
                 <a:rPr lang="es-CO" sz="1200" b="1" dirty="0" smtClean="0"/>
-                <a:t> TRM </a:t>
+                <a:t>TRM </a:t>
               </a:r>
               <a:r>
                 <a:rPr lang="es-CO" sz="1200" b="1" dirty="0" err="1" smtClean="0"/>
@@ -12724,13 +12732,13 @@
             </a:prstGeom>
           </p:spPr>
           <p:style>
-            <a:lnRef idx="1">
+            <a:lnRef idx="2">
               <a:schemeClr val="accent3"/>
             </a:lnRef>
-            <a:fillRef idx="2">
-              <a:schemeClr val="accent3"/>
+            <a:fillRef idx="1">
+              <a:schemeClr val="lt1"/>
             </a:fillRef>
-            <a:effectRef idx="1">
+            <a:effectRef idx="0">
               <a:schemeClr val="accent3"/>
             </a:effectRef>
             <a:fontRef idx="minor">
@@ -12797,13 +12805,13 @@
             </a:prstGeom>
           </p:spPr>
           <p:style>
-            <a:lnRef idx="1">
+            <a:lnRef idx="2">
               <a:schemeClr val="accent3"/>
             </a:lnRef>
-            <a:fillRef idx="2">
-              <a:schemeClr val="accent3"/>
+            <a:fillRef idx="1">
+              <a:schemeClr val="lt1"/>
             </a:fillRef>
-            <a:effectRef idx="1">
+            <a:effectRef idx="0">
               <a:schemeClr val="accent3"/>
             </a:effectRef>
             <a:fontRef idx="minor">
@@ -12815,12 +12823,12 @@
             <a:lstStyle/>
             <a:p>
               <a:r>
-                <a:rPr lang="es-CO" sz="1200" b="1" dirty="0" err="1" smtClean="0"/>
-                <a:t>Invocacion</a:t>
+                <a:rPr lang="es-CO" sz="1200" b="1" dirty="0" smtClean="0"/>
+                <a:t>Invocación </a:t>
               </a:r>
               <a:r>
                 <a:rPr lang="es-CO" sz="1200" b="1" dirty="0" smtClean="0"/>
-                <a:t> TRM </a:t>
+                <a:t>TRM </a:t>
               </a:r>
               <a:r>
                 <a:rPr lang="es-CO" sz="1200" b="1" dirty="0" err="1" smtClean="0"/>
@@ -12846,13 +12854,13 @@
             </a:prstGeom>
           </p:spPr>
           <p:style>
-            <a:lnRef idx="1">
+            <a:lnRef idx="2">
               <a:schemeClr val="accent3"/>
             </a:lnRef>
-            <a:fillRef idx="2">
-              <a:schemeClr val="accent3"/>
+            <a:fillRef idx="1">
+              <a:schemeClr val="lt1"/>
             </a:fillRef>
-            <a:effectRef idx="1">
+            <a:effectRef idx="0">
               <a:schemeClr val="accent3"/>
             </a:effectRef>
             <a:fontRef idx="minor">
@@ -12919,13 +12927,13 @@
             </a:prstGeom>
           </p:spPr>
           <p:style>
-            <a:lnRef idx="1">
+            <a:lnRef idx="2">
               <a:schemeClr val="accent3"/>
             </a:lnRef>
-            <a:fillRef idx="2">
-              <a:schemeClr val="accent3"/>
+            <a:fillRef idx="1">
+              <a:schemeClr val="lt1"/>
             </a:fillRef>
-            <a:effectRef idx="1">
+            <a:effectRef idx="0">
               <a:schemeClr val="accent3"/>
             </a:effectRef>
             <a:fontRef idx="minor">
@@ -12937,12 +12945,12 @@
             <a:lstStyle/>
             <a:p>
               <a:r>
-                <a:rPr lang="es-CO" sz="1200" b="1" dirty="0" err="1" smtClean="0"/>
-                <a:t>Adaptacion</a:t>
+                <a:rPr lang="es-CO" sz="1200" b="1" dirty="0" smtClean="0"/>
+                <a:t>Adaptación </a:t>
               </a:r>
               <a:r>
                 <a:rPr lang="es-CO" sz="1200" b="1" dirty="0" smtClean="0"/>
-                <a:t> Sistema Auditoria</a:t>
+                <a:t>Sistema Auditoria</a:t>
               </a:r>
               <a:endParaRPr lang="es-CO" sz="1200" b="1" dirty="0"/>
             </a:p>
@@ -12964,13 +12972,13 @@
             </a:prstGeom>
           </p:spPr>
           <p:style>
-            <a:lnRef idx="1">
+            <a:lnRef idx="2">
               <a:schemeClr val="accent3"/>
             </a:lnRef>
-            <a:fillRef idx="2">
-              <a:schemeClr val="accent3"/>
+            <a:fillRef idx="1">
+              <a:schemeClr val="lt1"/>
             </a:fillRef>
-            <a:effectRef idx="1">
+            <a:effectRef idx="0">
               <a:schemeClr val="accent3"/>
             </a:effectRef>
             <a:fontRef idx="minor">
@@ -13086,6 +13094,12 @@
             <a:chOff x="467544" y="1988840"/>
             <a:chExt cx="1570464" cy="634360"/>
           </a:xfrm>
+          <a:solidFill>
+            <a:schemeClr val="accent4">
+              <a:lumMod val="20000"/>
+              <a:lumOff val="80000"/>
+            </a:schemeClr>
+          </a:solidFill>
         </p:grpSpPr>
         <p:sp>
           <p:nvSpPr>
@@ -13101,19 +13115,20 @@
             <a:prstGeom prst="rect">
               <a:avLst/>
             </a:prstGeom>
+            <a:grpFill/>
           </p:spPr>
           <p:style>
-            <a:lnRef idx="1">
+            <a:lnRef idx="2">
               <a:schemeClr val="accent4"/>
             </a:lnRef>
-            <a:fillRef idx="3">
-              <a:schemeClr val="accent4"/>
+            <a:fillRef idx="1">
+              <a:schemeClr val="lt1"/>
             </a:fillRef>
-            <a:effectRef idx="2">
+            <a:effectRef idx="0">
               <a:schemeClr val="accent4"/>
             </a:effectRef>
             <a:fontRef idx="minor">
-              <a:schemeClr val="lt1"/>
+              <a:schemeClr val="dk1"/>
             </a:fontRef>
           </p:style>
           <p:txBody>
@@ -13121,12 +13136,12 @@
             <a:lstStyle/>
             <a:p>
               <a:r>
-                <a:rPr lang="es-CO" sz="1200" b="1" dirty="0" err="1" smtClean="0"/>
-                <a:t>Atualizacion</a:t>
+                <a:rPr lang="es-CO" sz="1200" b="1" dirty="0" smtClean="0"/>
+                <a:t>Actualización </a:t>
               </a:r>
               <a:r>
                 <a:rPr lang="es-CO" sz="1200" b="1" dirty="0" smtClean="0"/>
-                <a:t> Plataformas</a:t>
+                <a:t>Plataformas</a:t>
               </a:r>
               <a:endParaRPr lang="es-CO" sz="1200" b="1" dirty="0"/>
             </a:p>
@@ -13146,19 +13161,20 @@
             <a:prstGeom prst="ellipse">
               <a:avLst/>
             </a:prstGeom>
+            <a:grpFill/>
           </p:spPr>
           <p:style>
-            <a:lnRef idx="1">
+            <a:lnRef idx="2">
               <a:schemeClr val="accent4"/>
             </a:lnRef>
-            <a:fillRef idx="3">
-              <a:schemeClr val="accent4"/>
+            <a:fillRef idx="1">
+              <a:schemeClr val="lt1"/>
             </a:fillRef>
-            <a:effectRef idx="2">
+            <a:effectRef idx="0">
               <a:schemeClr val="accent4"/>
             </a:effectRef>
             <a:fontRef idx="minor">
-              <a:schemeClr val="lt1"/>
+              <a:schemeClr val="dk1"/>
             </a:fontRef>
           </p:style>
           <p:txBody>
@@ -13221,13 +13237,13 @@
             </a:prstGeom>
           </p:spPr>
           <p:style>
-            <a:lnRef idx="1">
+            <a:lnRef idx="2">
               <a:schemeClr val="accent4"/>
             </a:lnRef>
-            <a:fillRef idx="2">
-              <a:schemeClr val="accent4"/>
+            <a:fillRef idx="1">
+              <a:schemeClr val="lt1"/>
             </a:fillRef>
-            <a:effectRef idx="1">
+            <a:effectRef idx="0">
               <a:schemeClr val="accent4"/>
             </a:effectRef>
             <a:fontRef idx="minor">
@@ -13239,12 +13255,12 @@
             <a:lstStyle/>
             <a:p>
               <a:r>
-                <a:rPr lang="es-CO" sz="1200" b="1" dirty="0" err="1" smtClean="0"/>
-                <a:t>Optimizacion</a:t>
+                <a:rPr lang="es-CO" sz="1200" b="1" dirty="0" smtClean="0"/>
+                <a:t>Optimización </a:t>
               </a:r>
               <a:r>
                 <a:rPr lang="es-CO" sz="1200" b="1" dirty="0" smtClean="0"/>
-                <a:t> de Reportes</a:t>
+                <a:t>de Reportes</a:t>
               </a:r>
               <a:endParaRPr lang="es-CO" sz="1200" b="1" dirty="0"/>
             </a:p>
@@ -13266,13 +13282,13 @@
             </a:prstGeom>
           </p:spPr>
           <p:style>
-            <a:lnRef idx="1">
+            <a:lnRef idx="2">
               <a:schemeClr val="accent4"/>
             </a:lnRef>
-            <a:fillRef idx="2">
-              <a:schemeClr val="accent4"/>
+            <a:fillRef idx="1">
+              <a:schemeClr val="lt1"/>
             </a:fillRef>
-            <a:effectRef idx="1">
+            <a:effectRef idx="0">
               <a:schemeClr val="accent4"/>
             </a:effectRef>
             <a:fontRef idx="minor">
@@ -13350,21 +13366,6 @@
               <a:defRPr/>
             </a:pPr>
             <a:r>
-              <a:rPr lang="es-CO" sz="1600" b="1" i="1" dirty="0" err="1" smtClean="0">
-                <a:effectLst>
-                  <a:outerShdw blurRad="38100" dist="38100" dir="2700000" algn="tl">
-                    <a:srgbClr val="000000">
-                      <a:alpha val="43137"/>
-                    </a:srgbClr>
-                  </a:outerShdw>
-                </a:effectLst>
-                <a:latin typeface="+mj-lt"/>
-                <a:ea typeface="+mj-ea"/>
-                <a:cs typeface="+mj-cs"/>
-              </a:rPr>
-              <a:t>Tecnologia</a:t>
-            </a:r>
-            <a:r>
               <a:rPr lang="es-CO" sz="1600" b="1" i="1" dirty="0" smtClean="0">
                 <a:effectLst>
                   <a:outerShdw blurRad="38100" dist="38100" dir="2700000" algn="tl">
@@ -13377,7 +13378,7 @@
                 <a:ea typeface="+mj-ea"/>
                 <a:cs typeface="+mj-cs"/>
               </a:rPr>
-              <a:t> </a:t>
+              <a:t>Tecnología </a:t>
             </a:r>
             <a:endParaRPr kumimoji="0" lang="es-CO" sz="1600" b="1" i="1" u="none" strike="noStrike" kern="1200" cap="none" spc="0" normalizeH="0" baseline="0" noProof="0" dirty="0" smtClean="0">
               <a:ln>
@@ -16841,21 +16842,8 @@
           <a:p>
             <a:r>
               <a:rPr lang="es-CO" sz="1600" b="1" i="1" dirty="0" smtClean="0"/>
-              <a:t>201110544      </a:t>
+              <a:t>201110544      Willian Idrobo</a:t>
             </a:r>
-            <a:r>
-              <a:rPr lang="es-CO" sz="1600" b="1" i="1" dirty="0" smtClean="0"/>
-              <a:t>Willian</a:t>
-            </a:r>
-            <a:r>
-              <a:rPr lang="es-CO" sz="1600" b="1" i="1" dirty="0" smtClean="0"/>
-              <a:t> </a:t>
-            </a:r>
-            <a:r>
-              <a:rPr lang="es-CO" sz="1600" b="1" i="1" dirty="0" smtClean="0"/>
-              <a:t>Idrobo</a:t>
-            </a:r>
-            <a:endParaRPr lang="es-CO" sz="1600" b="1" i="1" dirty="0" smtClean="0"/>
           </a:p>
           <a:p>
             <a:r>
@@ -27888,26 +27876,6 @@
               </a:rPr>
               <a:t>Posibles Riesgos</a:t>
             </a:r>
-            <a:endParaRPr kumimoji="0" lang="es-CO" sz="2400" i="1" u="none" strike="noStrike" kern="1200" cap="none" spc="0" normalizeH="0" baseline="0" noProof="0" dirty="0" smtClean="0">
-              <a:ln>
-                <a:noFill/>
-              </a:ln>
-              <a:solidFill>
-                <a:schemeClr val="tx1"/>
-              </a:solidFill>
-              <a:effectLst>
-                <a:outerShdw blurRad="38100" dist="38100" dir="2700000" algn="tl">
-                  <a:srgbClr val="000000">
-                    <a:alpha val="43137"/>
-                  </a:srgbClr>
-                </a:outerShdw>
-              </a:effectLst>
-              <a:uLnTx/>
-              <a:uFillTx/>
-              <a:latin typeface="+mj-lt"/>
-              <a:ea typeface="+mj-ea"/>
-              <a:cs typeface="+mj-cs"/>
-            </a:endParaRPr>
           </a:p>
         </p:txBody>
       </p:sp>
@@ -28115,7 +28083,7 @@
           <p:nvPr>
             <p:extLst>
               <p:ext uri="{D42A27DB-BD31-4B8C-83A1-F6EECF244321}">
-                <p14:modId xmlns:p14="http://schemas.microsoft.com/office/powerpoint/2010/main" xmlns="" val="711205138"/>
+                <p14:modId xmlns="" xmlns:p14="http://schemas.microsoft.com/office/powerpoint/2010/main" val="711205138"/>
               </p:ext>
             </p:extLst>
           </p:nvPr>
@@ -28487,7 +28455,7 @@
     </p:spTree>
     <p:extLst>
       <p:ext uri="{BB962C8B-B14F-4D97-AF65-F5344CB8AC3E}">
-        <p14:creationId xmlns:p14="http://schemas.microsoft.com/office/powerpoint/2010/main" xmlns="" val="1382743894"/>
+        <p14:creationId xmlns="" xmlns:p14="http://schemas.microsoft.com/office/powerpoint/2010/main" val="1382743894"/>
       </p:ext>
     </p:extLst>
   </p:cSld>
@@ -28910,7 +28878,6 @@
               <a:rPr lang="es-CO" sz="2000" b="1" i="1" dirty="0" smtClean="0"/>
               <a:t>Motivadores</a:t>
             </a:r>
-            <a:endParaRPr lang="es-CO" sz="2000" b="1" i="1" dirty="0" smtClean="0"/>
           </a:p>
           <a:p>
             <a:r>
@@ -28927,11 +28894,7 @@
           <a:p>
             <a:r>
               <a:rPr lang="es-CO" sz="2000" b="1" i="1" dirty="0" smtClean="0"/>
-              <a:t>Vista </a:t>
-            </a:r>
-            <a:r>
-              <a:rPr lang="es-CO" sz="2000" b="1" i="1" dirty="0" smtClean="0"/>
-              <a:t>de Procesos</a:t>
+              <a:t>Vista de Procesos</a:t>
             </a:r>
           </a:p>
           <a:p>
@@ -28943,11 +28906,7 @@
           <a:p>
             <a:r>
               <a:rPr lang="es-CO" sz="2000" b="1" i="1" dirty="0" smtClean="0"/>
-              <a:t>BluePrint</a:t>
-            </a:r>
-            <a:r>
-              <a:rPr lang="es-CO" sz="2000" b="1" i="1" dirty="0" smtClean="0"/>
-              <a:t> de Arquitectura</a:t>
+              <a:t>BluePrint de Arquitectura</a:t>
             </a:r>
           </a:p>
           <a:p>
@@ -29511,26 +29470,6 @@
               </a:rPr>
               <a:t>Motivadores</a:t>
             </a:r>
-            <a:endParaRPr kumimoji="0" lang="es-CO" sz="2400" i="1" u="none" strike="noStrike" kern="1200" cap="none" spc="0" normalizeH="0" baseline="0" noProof="0" dirty="0" smtClean="0">
-              <a:ln>
-                <a:noFill/>
-              </a:ln>
-              <a:solidFill>
-                <a:schemeClr val="tx1"/>
-              </a:solidFill>
-              <a:effectLst>
-                <a:outerShdw blurRad="38100" dist="38100" dir="2700000" algn="tl">
-                  <a:srgbClr val="000000">
-                    <a:alpha val="43137"/>
-                  </a:srgbClr>
-                </a:outerShdw>
-              </a:effectLst>
-              <a:uLnTx/>
-              <a:uFillTx/>
-              <a:latin typeface="+mj-lt"/>
-              <a:ea typeface="+mj-ea"/>
-              <a:cs typeface="+mj-cs"/>
-            </a:endParaRPr>
           </a:p>
         </p:txBody>
       </p:sp>
@@ -30498,7 +30437,7 @@
           <a:blip r:embed="rId6" cstate="print">
             <a:extLst>
               <a:ext uri="{28A0092B-C50C-407E-A947-70E740481C1C}">
-                <a14:useLocalDpi xmlns:lc="http://schemas.openxmlformats.org/drawingml/2006/lockedCanvas" xmlns:pic="http://schemas.openxmlformats.org/drawingml/2006/picture" xmlns:a14="http://schemas.microsoft.com/office/drawing/2010/main" xmlns:wps="http://schemas.microsoft.com/office/word/2010/wordprocessingShape" xmlns:wpi="http://schemas.microsoft.com/office/word/2010/wordprocessingInk" xmlns:wpg="http://schemas.microsoft.com/office/word/2010/wordprocessingGroup" xmlns:w14="http://schemas.microsoft.com/office/word/2010/wordml" xmlns:w="http://schemas.openxmlformats.org/wordprocessingml/2006/main" xmlns:w10="urn:schemas-microsoft-com:office:word" xmlns:wp14="http://schemas.microsoft.com/office/word/2010/wordprocessingDrawing" xmlns:v="urn:schemas-microsoft-com:vml" xmlns:o="urn:schemas-microsoft-com:office:office" xmlns:mc="http://schemas.openxmlformats.org/markup-compatibility/2006" xmlns:wpc="http://schemas.microsoft.com/office/word/2010/wordprocessingCanvas" xmlns="" xmlns:wne="http://schemas.microsoft.com/office/word/2006/wordml" xmlns:wp="http://schemas.openxmlformats.org/drawingml/2006/wordprocessingDrawing" xmlns:m="http://schemas.openxmlformats.org/officeDocument/2006/math" xmlns:ve="http://schemas.openxmlformats.org/markup-compatibility/2006" val="0"/>
+                <a14:useLocalDpi xmlns:ve="http://schemas.openxmlformats.org/markup-compatibility/2006" xmlns:m="http://schemas.openxmlformats.org/officeDocument/2006/math" xmlns:wp="http://schemas.openxmlformats.org/drawingml/2006/wordprocessingDrawing" xmlns:wne="http://schemas.microsoft.com/office/word/2006/wordml" xmlns="" xmlns:wpc="http://schemas.microsoft.com/office/word/2010/wordprocessingCanvas" xmlns:mc="http://schemas.openxmlformats.org/markup-compatibility/2006" xmlns:o="urn:schemas-microsoft-com:office:office" xmlns:v="urn:schemas-microsoft-com:vml" xmlns:wp14="http://schemas.microsoft.com/office/word/2010/wordprocessingDrawing" xmlns:w10="urn:schemas-microsoft-com:office:word" xmlns:w="http://schemas.openxmlformats.org/wordprocessingml/2006/main" xmlns:w14="http://schemas.microsoft.com/office/word/2010/wordml" xmlns:wpg="http://schemas.microsoft.com/office/word/2010/wordprocessingGroup" xmlns:wpi="http://schemas.microsoft.com/office/word/2010/wordprocessingInk" xmlns:wps="http://schemas.microsoft.com/office/word/2010/wordprocessingShape" xmlns:a14="http://schemas.microsoft.com/office/drawing/2010/main" xmlns:pic="http://schemas.openxmlformats.org/drawingml/2006/picture" xmlns:lc="http://schemas.openxmlformats.org/drawingml/2006/lockedCanvas" val="0"/>
               </a:ext>
             </a:extLst>
           </a:blip>
@@ -30908,7 +30847,7 @@
     </p:spTree>
     <p:extLst>
       <p:ext uri="{BB962C8B-B14F-4D97-AF65-F5344CB8AC3E}">
-        <p14:creationId xmlns:p14="http://schemas.microsoft.com/office/powerpoint/2010/main" xmlns="" val="2415736106"/>
+        <p14:creationId xmlns="" xmlns:p14="http://schemas.microsoft.com/office/powerpoint/2010/main" val="2415736106"/>
       </p:ext>
     </p:extLst>
   </p:cSld>
@@ -31395,7 +31334,7 @@
           <a:blip r:embed="rId6" cstate="print">
             <a:extLst>
               <a:ext uri="{28A0092B-C50C-407E-A947-70E740481C1C}">
-                <a14:useLocalDpi xmlns:a14="http://schemas.microsoft.com/office/drawing/2010/main" xmlns="" val="0"/>
+                <a14:useLocalDpi xmlns="" xmlns:a14="http://schemas.microsoft.com/office/drawing/2010/main" val="0"/>
               </a:ext>
             </a:extLst>
           </a:blip>
@@ -31421,7 +31360,7 @@
     </p:spTree>
     <p:extLst>
       <p:ext uri="{BB962C8B-B14F-4D97-AF65-F5344CB8AC3E}">
-        <p14:creationId xmlns:p14="http://schemas.microsoft.com/office/powerpoint/2010/main" xmlns="" val="2173283949"/>
+        <p14:creationId xmlns="" xmlns:p14="http://schemas.microsoft.com/office/powerpoint/2010/main" val="2173283949"/>
       </p:ext>
     </p:extLst>
   </p:cSld>
@@ -32299,7 +32238,7 @@
           <a:blip r:embed="rId6" cstate="print">
             <a:extLst>
               <a:ext uri="{28A0092B-C50C-407E-A947-70E740481C1C}">
-                <a14:useLocalDpi xmlns:a14="http://schemas.microsoft.com/office/drawing/2010/main" xmlns="" val="0"/>
+                <a14:useLocalDpi xmlns="" xmlns:a14="http://schemas.microsoft.com/office/drawing/2010/main" val="0"/>
               </a:ext>
             </a:extLst>
           </a:blip>
@@ -32321,14 +32260,14 @@
           <a:effectLst/>
           <a:extLst>
             <a:ext uri="{909E8E84-426E-40DD-AFC4-6F175D3DCCD1}">
-              <a14:hiddenFill xmlns:a14="http://schemas.microsoft.com/office/drawing/2010/main" xmlns="">
+              <a14:hiddenFill xmlns="" xmlns:a14="http://schemas.microsoft.com/office/drawing/2010/main">
                 <a:solidFill>
                   <a:schemeClr val="accent1"/>
                 </a:solidFill>
               </a14:hiddenFill>
             </a:ext>
             <a:ext uri="{91240B29-F687-4F45-9708-019B960494DF}">
-              <a14:hiddenLine xmlns:a14="http://schemas.microsoft.com/office/drawing/2010/main" xmlns="" w="9525">
+              <a14:hiddenLine xmlns="" xmlns:a14="http://schemas.microsoft.com/office/drawing/2010/main" w="9525">
                 <a:solidFill>
                   <a:schemeClr val="tx1"/>
                 </a:solidFill>
@@ -32338,7 +32277,7 @@
               </a14:hiddenLine>
             </a:ext>
             <a:ext uri="{AF507438-7753-43E0-B8FC-AC1667EBCBE1}">
-              <a14:hiddenEffects xmlns:a14="http://schemas.microsoft.com/office/drawing/2010/main" xmlns="">
+              <a14:hiddenEffects xmlns="" xmlns:a14="http://schemas.microsoft.com/office/drawing/2010/main">
                 <a:effectLst>
                   <a:outerShdw dist="35921" dir="2700000" algn="ctr" rotWithShape="0">
                     <a:schemeClr val="bg2"/>
@@ -32423,7 +32362,7 @@
     </p:spTree>
     <p:extLst>
       <p:ext uri="{BB962C8B-B14F-4D97-AF65-F5344CB8AC3E}">
-        <p14:creationId xmlns:p14="http://schemas.microsoft.com/office/powerpoint/2010/main" xmlns="" val="2404779217"/>
+        <p14:creationId xmlns="" xmlns:p14="http://schemas.microsoft.com/office/powerpoint/2010/main" val="2404779217"/>
       </p:ext>
     </p:extLst>
   </p:cSld>

</xml_diff>